<commit_message>
Update GOAP-Oriented Action Planning.pptx
</commit_message>
<xml_diff>
--- a/GOAP-Oriented Action Planning.pptx
+++ b/GOAP-Oriented Action Planning.pptx
@@ -5,7 +5,7 @@
     <p:sldMasterId id="2147483660" r:id="rId1"/>
   </p:sldMasterIdLst>
   <p:notesMasterIdLst>
-    <p:notesMasterId r:id="rId14"/>
+    <p:notesMasterId r:id="rId15"/>
   </p:notesMasterIdLst>
   <p:sldIdLst>
     <p:sldId id="256" r:id="rId2"/>
@@ -16,10 +16,11 @@
     <p:sldId id="261" r:id="rId7"/>
     <p:sldId id="262" r:id="rId8"/>
     <p:sldId id="263" r:id="rId9"/>
-    <p:sldId id="264" r:id="rId10"/>
-    <p:sldId id="265" r:id="rId11"/>
-    <p:sldId id="266" r:id="rId12"/>
-    <p:sldId id="267" r:id="rId13"/>
+    <p:sldId id="268" r:id="rId10"/>
+    <p:sldId id="264" r:id="rId11"/>
+    <p:sldId id="265" r:id="rId12"/>
+    <p:sldId id="266" r:id="rId13"/>
+    <p:sldId id="267" r:id="rId14"/>
   </p:sldIdLst>
   <p:sldSz cx="12192000" cy="6858000"/>
   <p:notesSz cx="6858000" cy="9144000"/>
@@ -208,7 +209,7 @@
           <a:p>
             <a:fld id="{DB173074-56B0-41EA-98BC-3C16971418F6}" type="datetimeFigureOut">
               <a:rPr lang="en-GB" smtClean="0"/>
-              <a:t>29/09/2024</a:t>
+              <a:t>30/09/2024</a:t>
             </a:fld>
             <a:endParaRPr lang="en-GB"/>
           </a:p>
@@ -873,7 +874,7 @@
           <a:p>
             <a:fld id="{1B9CE9F2-B5FB-4BE7-8145-B0BEFEDA1824}" type="datetimeFigureOut">
               <a:rPr lang="en-GB" smtClean="0"/>
-              <a:t>29/09/2024</a:t>
+              <a:t>30/09/2024</a:t>
             </a:fld>
             <a:endParaRPr lang="en-GB"/>
           </a:p>
@@ -1081,7 +1082,7 @@
           <a:p>
             <a:fld id="{1B9CE9F2-B5FB-4BE7-8145-B0BEFEDA1824}" type="datetimeFigureOut">
               <a:rPr lang="en-GB" smtClean="0"/>
-              <a:t>29/09/2024</a:t>
+              <a:t>30/09/2024</a:t>
             </a:fld>
             <a:endParaRPr lang="en-GB"/>
           </a:p>
@@ -1337,7 +1338,7 @@
           <a:p>
             <a:fld id="{1B9CE9F2-B5FB-4BE7-8145-B0BEFEDA1824}" type="datetimeFigureOut">
               <a:rPr lang="en-GB" smtClean="0"/>
-              <a:t>29/09/2024</a:t>
+              <a:t>30/09/2024</a:t>
             </a:fld>
             <a:endParaRPr lang="en-GB"/>
           </a:p>
@@ -1511,7 +1512,7 @@
           <a:p>
             <a:fld id="{1B9CE9F2-B5FB-4BE7-8145-B0BEFEDA1824}" type="datetimeFigureOut">
               <a:rPr lang="en-GB" smtClean="0"/>
-              <a:t>29/09/2024</a:t>
+              <a:t>30/09/2024</a:t>
             </a:fld>
             <a:endParaRPr lang="en-GB"/>
           </a:p>
@@ -1854,7 +1855,7 @@
           <a:p>
             <a:fld id="{1B9CE9F2-B5FB-4BE7-8145-B0BEFEDA1824}" type="datetimeFigureOut">
               <a:rPr lang="en-GB" smtClean="0"/>
-              <a:t>29/09/2024</a:t>
+              <a:t>30/09/2024</a:t>
             </a:fld>
             <a:endParaRPr lang="en-GB"/>
           </a:p>
@@ -2129,7 +2130,7 @@
           <a:p>
             <a:fld id="{1B9CE9F2-B5FB-4BE7-8145-B0BEFEDA1824}" type="datetimeFigureOut">
               <a:rPr lang="en-GB" smtClean="0"/>
-              <a:t>29/09/2024</a:t>
+              <a:t>30/09/2024</a:t>
             </a:fld>
             <a:endParaRPr lang="en-GB"/>
           </a:p>
@@ -2508,7 +2509,7 @@
           <a:p>
             <a:fld id="{1B9CE9F2-B5FB-4BE7-8145-B0BEFEDA1824}" type="datetimeFigureOut">
               <a:rPr lang="en-GB" smtClean="0"/>
-              <a:t>29/09/2024</a:t>
+              <a:t>30/09/2024</a:t>
             </a:fld>
             <a:endParaRPr lang="en-GB"/>
           </a:p>
@@ -2626,7 +2627,7 @@
           <a:p>
             <a:fld id="{1B9CE9F2-B5FB-4BE7-8145-B0BEFEDA1824}" type="datetimeFigureOut">
               <a:rPr lang="en-GB" smtClean="0"/>
-              <a:t>29/09/2024</a:t>
+              <a:t>30/09/2024</a:t>
             </a:fld>
             <a:endParaRPr lang="en-GB"/>
           </a:p>
@@ -2797,7 +2798,7 @@
           <a:p>
             <a:fld id="{1B9CE9F2-B5FB-4BE7-8145-B0BEFEDA1824}" type="datetimeFigureOut">
               <a:rPr lang="en-GB" smtClean="0"/>
-              <a:t>29/09/2024</a:t>
+              <a:t>30/09/2024</a:t>
             </a:fld>
             <a:endParaRPr lang="en-GB"/>
           </a:p>
@@ -3151,7 +3152,7 @@
           <a:p>
             <a:fld id="{1B9CE9F2-B5FB-4BE7-8145-B0BEFEDA1824}" type="datetimeFigureOut">
               <a:rPr lang="en-GB" smtClean="0"/>
-              <a:t>29/09/2024</a:t>
+              <a:t>30/09/2024</a:t>
             </a:fld>
             <a:endParaRPr lang="en-GB"/>
           </a:p>
@@ -3533,7 +3534,7 @@
           <a:p>
             <a:fld id="{1B9CE9F2-B5FB-4BE7-8145-B0BEFEDA1824}" type="datetimeFigureOut">
               <a:rPr lang="en-GB" smtClean="0"/>
-              <a:t>29/09/2024</a:t>
+              <a:t>30/09/2024</a:t>
             </a:fld>
             <a:endParaRPr lang="en-GB"/>
           </a:p>
@@ -3820,7 +3821,7 @@
           <a:p>
             <a:fld id="{1B9CE9F2-B5FB-4BE7-8145-B0BEFEDA1824}" type="datetimeFigureOut">
               <a:rPr lang="en-GB" smtClean="0"/>
-              <a:t>29/09/2024</a:t>
+              <a:t>30/09/2024</a:t>
             </a:fld>
             <a:endParaRPr lang="en-GB"/>
           </a:p>
@@ -4435,6 +4436,123 @@
           <p:cNvPr id="2" name="Title 1">
             <a:extLst>
               <a:ext uri="{FF2B5EF4-FFF2-40B4-BE49-F238E27FC236}">
+                <a16:creationId xmlns:a16="http://schemas.microsoft.com/office/drawing/2014/main" id="{0EE06C65-3C5C-4B29-E5E1-7A58C57A9FE7}"/>
+              </a:ext>
+            </a:extLst>
+          </p:cNvPr>
+          <p:cNvSpPr>
+            <a:spLocks noGrp="1"/>
+          </p:cNvSpPr>
+          <p:nvPr>
+            <p:ph type="title"/>
+          </p:nvPr>
+        </p:nvSpPr>
+        <p:spPr/>
+        <p:txBody>
+          <a:bodyPr/>
+          <a:lstStyle/>
+          <a:p>
+            <a:r>
+              <a:rPr lang="en-GB" dirty="0"/>
+              <a:t>Results</a:t>
+            </a:r>
+          </a:p>
+        </p:txBody>
+      </p:sp>
+      <p:pic>
+        <p:nvPicPr>
+          <p:cNvPr id="5" name="Content Placeholder 4">
+            <a:extLst>
+              <a:ext uri="{FF2B5EF4-FFF2-40B4-BE49-F238E27FC236}">
+                <a16:creationId xmlns:a16="http://schemas.microsoft.com/office/drawing/2014/main" id="{BC226FCD-1A6C-BFD5-4333-395E34D53AA6}"/>
+              </a:ext>
+            </a:extLst>
+          </p:cNvPr>
+          <p:cNvPicPr>
+            <a:picLocks noGrp="1" noChangeAspect="1"/>
+          </p:cNvPicPr>
+          <p:nvPr>
+            <p:ph idx="1"/>
+          </p:nvPr>
+        </p:nvPicPr>
+        <p:blipFill>
+          <a:blip r:embed="rId2"/>
+          <a:stretch>
+            <a:fillRect/>
+          </a:stretch>
+        </p:blipFill>
+        <p:spPr>
+          <a:xfrm>
+            <a:off x="2700738" y="1847224"/>
+            <a:ext cx="7668695" cy="1714739"/>
+          </a:xfrm>
+        </p:spPr>
+      </p:pic>
+      <p:pic>
+        <p:nvPicPr>
+          <p:cNvPr id="7" name="Picture 6">
+            <a:extLst>
+              <a:ext uri="{FF2B5EF4-FFF2-40B4-BE49-F238E27FC236}">
+                <a16:creationId xmlns:a16="http://schemas.microsoft.com/office/drawing/2014/main" id="{3DD97E87-16A0-F091-8267-87F918EB9068}"/>
+              </a:ext>
+            </a:extLst>
+          </p:cNvPr>
+          <p:cNvPicPr>
+            <a:picLocks noChangeAspect="1"/>
+          </p:cNvPicPr>
+          <p:nvPr/>
+        </p:nvPicPr>
+        <p:blipFill>
+          <a:blip r:embed="rId3"/>
+          <a:stretch>
+            <a:fillRect/>
+          </a:stretch>
+        </p:blipFill>
+        <p:spPr>
+          <a:xfrm>
+            <a:off x="2700738" y="4520682"/>
+            <a:ext cx="6554115" cy="943107"/>
+          </a:xfrm>
+          <a:prstGeom prst="rect">
+            <a:avLst/>
+          </a:prstGeom>
+        </p:spPr>
+      </p:pic>
+    </p:spTree>
+    <p:extLst>
+      <p:ext uri="{BB962C8B-B14F-4D97-AF65-F5344CB8AC3E}">
+        <p14:creationId xmlns:p14="http://schemas.microsoft.com/office/powerpoint/2010/main" val="320730140"/>
+      </p:ext>
+    </p:extLst>
+  </p:cSld>
+  <p:clrMapOvr>
+    <a:masterClrMapping/>
+  </p:clrMapOvr>
+</p:sld>
+</file>
+
+<file path=ppt/slides/slide11.xml><?xml version="1.0" encoding="utf-8"?>
+<p:sld xmlns:a="http://schemas.openxmlformats.org/drawingml/2006/main" xmlns:r="http://schemas.openxmlformats.org/officeDocument/2006/relationships" xmlns:p="http://schemas.openxmlformats.org/presentationml/2006/main">
+  <p:cSld>
+    <p:spTree>
+      <p:nvGrpSpPr>
+        <p:cNvPr id="1" name=""/>
+        <p:cNvGrpSpPr/>
+        <p:nvPr/>
+      </p:nvGrpSpPr>
+      <p:grpSpPr>
+        <a:xfrm>
+          <a:off x="0" y="0"/>
+          <a:ext cx="0" cy="0"/>
+          <a:chOff x="0" y="0"/>
+          <a:chExt cx="0" cy="0"/>
+        </a:xfrm>
+      </p:grpSpPr>
+      <p:sp>
+        <p:nvSpPr>
+          <p:cNvPr id="2" name="Title 1">
+            <a:extLst>
+              <a:ext uri="{FF2B5EF4-FFF2-40B4-BE49-F238E27FC236}">
                 <a16:creationId xmlns:a16="http://schemas.microsoft.com/office/drawing/2014/main" id="{406E9BD4-7284-F247-0920-1F8553387F75}"/>
               </a:ext>
             </a:extLst>
@@ -4530,7 +4648,7 @@
 </p:sld>
 </file>
 
-<file path=ppt/slides/slide11.xml><?xml version="1.0" encoding="utf-8"?>
+<file path=ppt/slides/slide12.xml><?xml version="1.0" encoding="utf-8"?>
 <p:sld xmlns:a="http://schemas.openxmlformats.org/drawingml/2006/main" xmlns:r="http://schemas.openxmlformats.org/officeDocument/2006/relationships" xmlns:p="http://schemas.openxmlformats.org/presentationml/2006/main">
   <p:cSld>
     <p:spTree>
@@ -4643,7 +4761,7 @@
 </p:sld>
 </file>
 
-<file path=ppt/slides/slide12.xml><?xml version="1.0" encoding="utf-8"?>
+<file path=ppt/slides/slide13.xml><?xml version="1.0" encoding="utf-8"?>
 <p:sld xmlns:a="http://schemas.openxmlformats.org/drawingml/2006/main" xmlns:r="http://schemas.openxmlformats.org/officeDocument/2006/relationships" xmlns:p="http://schemas.openxmlformats.org/presentationml/2006/main">
   <p:cSld>
     <p:spTree>
@@ -5216,6 +5334,156 @@
           </a:p>
         </p:txBody>
       </p:sp>
+      <p:pic>
+        <p:nvPicPr>
+          <p:cNvPr id="5" name="Picture 4">
+            <a:extLst>
+              <a:ext uri="{FF2B5EF4-FFF2-40B4-BE49-F238E27FC236}">
+                <a16:creationId xmlns:a16="http://schemas.microsoft.com/office/drawing/2014/main" id="{C5CDC2B4-BB57-FC95-4078-CEFBEE0E0F03}"/>
+              </a:ext>
+            </a:extLst>
+          </p:cNvPr>
+          <p:cNvPicPr>
+            <a:picLocks noChangeAspect="1"/>
+          </p:cNvPicPr>
+          <p:nvPr/>
+        </p:nvPicPr>
+        <p:blipFill>
+          <a:blip r:embed="rId2"/>
+          <a:stretch>
+            <a:fillRect/>
+          </a:stretch>
+        </p:blipFill>
+        <p:spPr>
+          <a:xfrm>
+            <a:off x="2738574" y="3438829"/>
+            <a:ext cx="2912012" cy="1278444"/>
+          </a:xfrm>
+          <a:prstGeom prst="rect">
+            <a:avLst/>
+          </a:prstGeom>
+        </p:spPr>
+      </p:pic>
+      <p:pic>
+        <p:nvPicPr>
+          <p:cNvPr id="7" name="Picture 6">
+            <a:extLst>
+              <a:ext uri="{FF2B5EF4-FFF2-40B4-BE49-F238E27FC236}">
+                <a16:creationId xmlns:a16="http://schemas.microsoft.com/office/drawing/2014/main" id="{E87DB645-C6C7-48A6-C67D-2FB32A54FFDE}"/>
+              </a:ext>
+            </a:extLst>
+          </p:cNvPr>
+          <p:cNvPicPr>
+            <a:picLocks noChangeAspect="1"/>
+          </p:cNvPicPr>
+          <p:nvPr/>
+        </p:nvPicPr>
+        <p:blipFill>
+          <a:blip r:embed="rId3"/>
+          <a:stretch>
+            <a:fillRect/>
+          </a:stretch>
+        </p:blipFill>
+        <p:spPr>
+          <a:xfrm>
+            <a:off x="5650586" y="3438829"/>
+            <a:ext cx="2929181" cy="1278444"/>
+          </a:xfrm>
+          <a:prstGeom prst="rect">
+            <a:avLst/>
+          </a:prstGeom>
+        </p:spPr>
+      </p:pic>
+      <p:pic>
+        <p:nvPicPr>
+          <p:cNvPr id="9" name="Picture 8">
+            <a:extLst>
+              <a:ext uri="{FF2B5EF4-FFF2-40B4-BE49-F238E27FC236}">
+                <a16:creationId xmlns:a16="http://schemas.microsoft.com/office/drawing/2014/main" id="{B99CA113-5F7D-5B34-BE52-1320C1721F4F}"/>
+              </a:ext>
+            </a:extLst>
+          </p:cNvPr>
+          <p:cNvPicPr>
+            <a:picLocks noChangeAspect="1"/>
+          </p:cNvPicPr>
+          <p:nvPr/>
+        </p:nvPicPr>
+        <p:blipFill>
+          <a:blip r:embed="rId4"/>
+          <a:stretch>
+            <a:fillRect/>
+          </a:stretch>
+        </p:blipFill>
+        <p:spPr>
+          <a:xfrm>
+            <a:off x="8579768" y="4068222"/>
+            <a:ext cx="2514951" cy="1390844"/>
+          </a:xfrm>
+          <a:prstGeom prst="rect">
+            <a:avLst/>
+          </a:prstGeom>
+        </p:spPr>
+      </p:pic>
+      <p:pic>
+        <p:nvPicPr>
+          <p:cNvPr id="11" name="Picture 10">
+            <a:extLst>
+              <a:ext uri="{FF2B5EF4-FFF2-40B4-BE49-F238E27FC236}">
+                <a16:creationId xmlns:a16="http://schemas.microsoft.com/office/drawing/2014/main" id="{B86C14B1-551B-9970-7E10-0A62971D5F1C}"/>
+              </a:ext>
+            </a:extLst>
+          </p:cNvPr>
+          <p:cNvPicPr>
+            <a:picLocks noChangeAspect="1"/>
+          </p:cNvPicPr>
+          <p:nvPr/>
+        </p:nvPicPr>
+        <p:blipFill>
+          <a:blip r:embed="rId5"/>
+          <a:stretch>
+            <a:fillRect/>
+          </a:stretch>
+        </p:blipFill>
+        <p:spPr>
+          <a:xfrm>
+            <a:off x="2738574" y="4736310"/>
+            <a:ext cx="2954568" cy="1287705"/>
+          </a:xfrm>
+          <a:prstGeom prst="rect">
+            <a:avLst/>
+          </a:prstGeom>
+        </p:spPr>
+      </p:pic>
+      <p:pic>
+        <p:nvPicPr>
+          <p:cNvPr id="13" name="Picture 12">
+            <a:extLst>
+              <a:ext uri="{FF2B5EF4-FFF2-40B4-BE49-F238E27FC236}">
+                <a16:creationId xmlns:a16="http://schemas.microsoft.com/office/drawing/2014/main" id="{9D9D10E4-0F98-C110-031B-B8F00C4C4F6B}"/>
+              </a:ext>
+            </a:extLst>
+          </p:cNvPr>
+          <p:cNvPicPr>
+            <a:picLocks noChangeAspect="1"/>
+          </p:cNvPicPr>
+          <p:nvPr/>
+        </p:nvPicPr>
+        <p:blipFill>
+          <a:blip r:embed="rId6"/>
+          <a:stretch>
+            <a:fillRect/>
+          </a:stretch>
+        </p:blipFill>
+        <p:spPr>
+          <a:xfrm>
+            <a:off x="5650586" y="4717273"/>
+            <a:ext cx="2971738" cy="1324751"/>
+          </a:xfrm>
+          <a:prstGeom prst="rect">
+            <a:avLst/>
+          </a:prstGeom>
+        </p:spPr>
+      </p:pic>
     </p:spTree>
     <p:extLst>
       <p:ext uri="{BB962C8B-B14F-4D97-AF65-F5344CB8AC3E}">
@@ -5551,7 +5819,7 @@
           <p:cNvPr id="2" name="Title 1">
             <a:extLst>
               <a:ext uri="{FF2B5EF4-FFF2-40B4-BE49-F238E27FC236}">
-                <a16:creationId xmlns:a16="http://schemas.microsoft.com/office/drawing/2014/main" id="{0EE06C65-3C5C-4B29-E5E1-7A58C57A9FE7}"/>
+                <a16:creationId xmlns:a16="http://schemas.microsoft.com/office/drawing/2014/main" id="{22009028-8376-C7BB-50C2-FE11ED1A51DA}"/>
               </a:ext>
             </a:extLst>
           </p:cNvPr>
@@ -5569,74 +5837,40 @@
           <a:p>
             <a:r>
               <a:rPr lang="en-GB" dirty="0"/>
-              <a:t>Results</a:t>
-            </a:r>
-          </a:p>
-        </p:txBody>
-      </p:sp>
-      <p:pic>
-        <p:nvPicPr>
-          <p:cNvPr id="5" name="Content Placeholder 4">
+              <a:t>Video</a:t>
+            </a:r>
+          </a:p>
+        </p:txBody>
+      </p:sp>
+      <p:sp>
+        <p:nvSpPr>
+          <p:cNvPr id="3" name="Content Placeholder 2">
             <a:extLst>
               <a:ext uri="{FF2B5EF4-FFF2-40B4-BE49-F238E27FC236}">
-                <a16:creationId xmlns:a16="http://schemas.microsoft.com/office/drawing/2014/main" id="{BC226FCD-1A6C-BFD5-4333-395E34D53AA6}"/>
+                <a16:creationId xmlns:a16="http://schemas.microsoft.com/office/drawing/2014/main" id="{E15A5EE4-77B3-750B-48F4-132BD1BE51DC}"/>
               </a:ext>
             </a:extLst>
           </p:cNvPr>
-          <p:cNvPicPr>
-            <a:picLocks noGrp="1" noChangeAspect="1"/>
-          </p:cNvPicPr>
+          <p:cNvSpPr>
+            <a:spLocks noGrp="1"/>
+          </p:cNvSpPr>
           <p:nvPr>
             <p:ph idx="1"/>
           </p:nvPr>
-        </p:nvPicPr>
-        <p:blipFill>
-          <a:blip r:embed="rId2"/>
-          <a:stretch>
-            <a:fillRect/>
-          </a:stretch>
-        </p:blipFill>
-        <p:spPr>
-          <a:xfrm>
-            <a:off x="2700738" y="1847224"/>
-            <a:ext cx="7668695" cy="1714739"/>
-          </a:xfrm>
-        </p:spPr>
-      </p:pic>
-      <p:pic>
-        <p:nvPicPr>
-          <p:cNvPr id="7" name="Picture 6">
-            <a:extLst>
-              <a:ext uri="{FF2B5EF4-FFF2-40B4-BE49-F238E27FC236}">
-                <a16:creationId xmlns:a16="http://schemas.microsoft.com/office/drawing/2014/main" id="{3DD97E87-16A0-F091-8267-87F918EB9068}"/>
-              </a:ext>
-            </a:extLst>
-          </p:cNvPr>
-          <p:cNvPicPr>
-            <a:picLocks noChangeAspect="1"/>
-          </p:cNvPicPr>
-          <p:nvPr/>
-        </p:nvPicPr>
-        <p:blipFill>
-          <a:blip r:embed="rId3"/>
-          <a:stretch>
-            <a:fillRect/>
-          </a:stretch>
-        </p:blipFill>
-        <p:spPr>
-          <a:xfrm>
-            <a:off x="2700738" y="4520682"/>
-            <a:ext cx="6554115" cy="943107"/>
-          </a:xfrm>
-          <a:prstGeom prst="rect">
-            <a:avLst/>
-          </a:prstGeom>
-        </p:spPr>
-      </p:pic>
+        </p:nvSpPr>
+        <p:spPr/>
+        <p:txBody>
+          <a:bodyPr/>
+          <a:lstStyle/>
+          <a:p>
+            <a:endParaRPr lang="en-GB"/>
+          </a:p>
+        </p:txBody>
+      </p:sp>
     </p:spTree>
     <p:extLst>
       <p:ext uri="{BB962C8B-B14F-4D97-AF65-F5344CB8AC3E}">
-        <p14:creationId xmlns:p14="http://schemas.microsoft.com/office/powerpoint/2010/main" val="320730140"/>
+        <p14:creationId xmlns:p14="http://schemas.microsoft.com/office/powerpoint/2010/main" val="2998050751"/>
       </p:ext>
     </p:extLst>
   </p:cSld>

</xml_diff>